<commit_message>
Fixed page with 'serve-index'
</commit_message>
<xml_diff>
--- a/node/lesson-60-express-middleware/express-middleware.pptx
+++ b/node/lesson-60-express-middleware/express-middleware.pptx
@@ -35,7 +35,7 @@
   <p:sldSz cx="9144000" cy="6858000" type="screen4x3"/>
   <p:notesSz cx="6858000" cy="9144000"/>
   <p:custDataLst>
-    <p:tags r:id="rId25"/>
+    <p:tags r:id="rId24"/>
   </p:custDataLst>
   <p:defaultTextStyle>
     <a:defPPr>
@@ -132,6 +132,71 @@
       </a:defRPr>
     </a:lvl9pPr>
   </p:defaultTextStyle>
+  <p:extLst>
+    <p:ext uri="{EFAFB233-063F-42B5-8137-9DF3F51BA10A}">
+      <p15:sldGuideLst xmlns:p15="http://schemas.microsoft.com/office/powerpoint/2012/main">
+        <p15:guide id="1" orient="horz" pos="4176">
+          <p15:clr>
+            <a:srgbClr val="A4A3A4"/>
+          </p15:clr>
+        </p15:guide>
+        <p15:guide id="2" orient="horz" pos="607">
+          <p15:clr>
+            <a:srgbClr val="A4A3A4"/>
+          </p15:clr>
+        </p15:guide>
+        <p15:guide id="3" orient="horz" pos="212">
+          <p15:clr>
+            <a:srgbClr val="A4A3A4"/>
+          </p15:clr>
+        </p15:guide>
+        <p15:guide id="4" orient="horz" pos="912">
+          <p15:clr>
+            <a:srgbClr val="A4A3A4"/>
+          </p15:clr>
+        </p15:guide>
+        <p15:guide id="5" orient="horz" pos="3969">
+          <p15:clr>
+            <a:srgbClr val="A4A3A4"/>
+          </p15:clr>
+        </p15:guide>
+        <p15:guide id="6" pos="1267">
+          <p15:clr>
+            <a:srgbClr val="A4A3A4"/>
+          </p15:clr>
+        </p15:guide>
+        <p15:guide id="7" pos="382">
+          <p15:clr>
+            <a:srgbClr val="A4A3A4"/>
+          </p15:clr>
+        </p15:guide>
+        <p15:guide id="8" pos="2880">
+          <p15:clr>
+            <a:srgbClr val="A4A3A4"/>
+          </p15:clr>
+        </p15:guide>
+        <p15:guide id="9" pos="5568">
+          <p15:clr>
+            <a:srgbClr val="A4A3A4"/>
+          </p15:clr>
+        </p15:guide>
+      </p15:sldGuideLst>
+    </p:ext>
+    <p:ext uri="{2D200454-40CA-4A62-9FC3-DE9A4176ACB9}">
+      <p15:notesGuideLst xmlns:p15="http://schemas.microsoft.com/office/powerpoint/2012/main">
+        <p15:guide id="1" orient="horz" pos="2880">
+          <p15:clr>
+            <a:srgbClr val="A4A3A4"/>
+          </p15:clr>
+        </p15:guide>
+        <p15:guide id="2" pos="2160">
+          <p15:clr>
+            <a:srgbClr val="A4A3A4"/>
+          </p15:clr>
+        </p15:guide>
+      </p15:notesGuideLst>
+    </p:ext>
+  </p:extLst>
 </p:presentation>
 </file>
 
@@ -1150,7 +1215,7 @@
   <p:timing>
     <p:tnLst>
       <p:par>
-        <p:cTn xmlns:p14="http://schemas.microsoft.com/office/powerpoint/2010/main" id="1" dur="indefinite" restart="never" nodeType="tmRoot"/>
+        <p:cTn id="1" dur="indefinite" restart="never" nodeType="tmRoot"/>
       </p:par>
     </p:tnLst>
   </p:timing>
@@ -1206,7 +1271,7 @@
           <a:noFill/>
           <a:extLst>
             <a:ext uri="{909E8E84-426E-40dd-AFC4-6F175D3DCCD1}">
-              <a14:hiddenFill xmlns:a14="http://schemas.microsoft.com/office/drawing/2010/main">
+              <a14:hiddenFill xmlns:a14="http://schemas.microsoft.com/office/drawing/2010/main" xmlns="">
                 <a:solidFill>
                   <a:srgbClr val="FFFFFF"/>
                 </a:solidFill>
@@ -1361,7 +1426,7 @@
   <p:timing>
     <p:tnLst>
       <p:par>
-        <p:cTn xmlns:p14="http://schemas.microsoft.com/office/powerpoint/2010/main" id="1" dur="indefinite" restart="never" nodeType="tmRoot"/>
+        <p:cTn id="1" dur="indefinite" restart="never" nodeType="tmRoot"/>
       </p:par>
     </p:tnLst>
   </p:timing>
@@ -1816,7 +1881,7 @@
   <p:timing>
     <p:tnLst>
       <p:par>
-        <p:cTn xmlns:p14="http://schemas.microsoft.com/office/powerpoint/2010/main" id="1" dur="indefinite" restart="never" nodeType="tmRoot"/>
+        <p:cTn id="1" dur="indefinite" restart="never" nodeType="tmRoot"/>
       </p:par>
     </p:tnLst>
   </p:timing>
@@ -2156,7 +2221,7 @@
   <p:timing>
     <p:tnLst>
       <p:par>
-        <p:cTn xmlns:p14="http://schemas.microsoft.com/office/powerpoint/2010/main" id="1" dur="indefinite" restart="never" nodeType="tmRoot"/>
+        <p:cTn id="1" dur="indefinite" restart="never" nodeType="tmRoot"/>
       </p:par>
     </p:tnLst>
   </p:timing>
@@ -2644,7 +2709,7 @@
   <p:timing>
     <p:tnLst>
       <p:par>
-        <p:cTn xmlns:p14="http://schemas.microsoft.com/office/powerpoint/2010/main" id="1" dur="indefinite" restart="never" nodeType="tmRoot"/>
+        <p:cTn id="1" dur="indefinite" restart="never" nodeType="tmRoot"/>
       </p:par>
     </p:tnLst>
   </p:timing>
@@ -3002,7 +3067,7 @@
   <p:timing>
     <p:tnLst>
       <p:par>
-        <p:cTn xmlns:p14="http://schemas.microsoft.com/office/powerpoint/2010/main" id="1" dur="indefinite" restart="never" nodeType="tmRoot"/>
+        <p:cTn id="1" dur="indefinite" restart="never" nodeType="tmRoot"/>
       </p:par>
     </p:tnLst>
   </p:timing>
@@ -3591,7 +3656,7 @@
   <p:timing>
     <p:tnLst>
       <p:par>
-        <p:cTn xmlns:p14="http://schemas.microsoft.com/office/powerpoint/2010/main" id="1" dur="indefinite" restart="never" nodeType="tmRoot"/>
+        <p:cTn id="1" dur="indefinite" restart="never" nodeType="tmRoot"/>
       </p:par>
     </p:tnLst>
   </p:timing>
@@ -4218,7 +4283,7 @@
   <p:timing>
     <p:tnLst>
       <p:par>
-        <p:cTn xmlns:p14="http://schemas.microsoft.com/office/powerpoint/2010/main" id="1" dur="indefinite" restart="never" nodeType="tmRoot"/>
+        <p:cTn id="1" dur="indefinite" restart="never" nodeType="tmRoot"/>
       </p:par>
     </p:tnLst>
   </p:timing>
@@ -4474,7 +4539,7 @@
   <p:timing>
     <p:tnLst>
       <p:par>
-        <p:cTn xmlns:p14="http://schemas.microsoft.com/office/powerpoint/2010/main" id="1" dur="indefinite" restart="never" nodeType="tmRoot"/>
+        <p:cTn id="1" dur="indefinite" restart="never" nodeType="tmRoot"/>
       </p:par>
     </p:tnLst>
   </p:timing>
@@ -5197,7 +5262,7 @@
   <p:timing>
     <p:tnLst>
       <p:par>
-        <p:cTn xmlns:p14="http://schemas.microsoft.com/office/powerpoint/2010/main" id="1" dur="indefinite" restart="never" nodeType="tmRoot"/>
+        <p:cTn id="1" dur="indefinite" restart="never" nodeType="tmRoot"/>
       </p:par>
     </p:tnLst>
   </p:timing>
@@ -5611,7 +5676,7 @@
   <p:timing>
     <p:tnLst>
       <p:par>
-        <p:cTn xmlns:p14="http://schemas.microsoft.com/office/powerpoint/2010/main" id="1" dur="indefinite" restart="never" nodeType="tmRoot"/>
+        <p:cTn id="1" dur="indefinite" restart="never" nodeType="tmRoot"/>
       </p:par>
     </p:tnLst>
   </p:timing>
@@ -6050,7 +6115,7 @@
   <p:timing>
     <p:tnLst>
       <p:par>
-        <p:cTn xmlns:p14="http://schemas.microsoft.com/office/powerpoint/2010/main" id="1" dur="indefinite" restart="never" nodeType="tmRoot"/>
+        <p:cTn id="1" dur="indefinite" restart="never" nodeType="tmRoot"/>
       </p:par>
     </p:tnLst>
   </p:timing>
@@ -6565,7 +6630,7 @@
   <p:timing>
     <p:tnLst>
       <p:par>
-        <p:cTn xmlns:p14="http://schemas.microsoft.com/office/powerpoint/2010/main" id="1" dur="indefinite" restart="never" nodeType="tmRoot"/>
+        <p:cTn id="1" dur="indefinite" restart="never" nodeType="tmRoot"/>
       </p:par>
     </p:tnLst>
   </p:timing>
@@ -6606,25 +6671,13 @@
           <a:p>
             <a:r>
               <a:rPr lang="en-US" dirty="0" smtClean="0"/>
-              <a:t>Handles requests for the </a:t>
-            </a:r>
+              <a:t>Handles requests for the favicon</a:t>
+            </a:r>
+          </a:p>
+          <a:p>
             <a:r>
               <a:rPr lang="en-US" dirty="0" smtClean="0"/>
-              <a:t>favicon</a:t>
-            </a:r>
-          </a:p>
-          <a:p>
-            <a:r>
-              <a:rPr lang="en-US" dirty="0" smtClean="0"/>
-              <a:t>Typically </a:t>
-            </a:r>
-            <a:r>
-              <a:rPr lang="en-US" dirty="0" smtClean="0"/>
-              <a:t>declared first in a stack of </a:t>
-            </a:r>
-            <a:r>
-              <a:rPr lang="en-US" dirty="0" smtClean="0"/>
-              <a:t>middleware</a:t>
+              <a:t>Typically declared first in a stack of middleware</a:t>
             </a:r>
           </a:p>
           <a:p>
@@ -7175,7 +7228,7 @@
   <p:timing>
     <p:tnLst>
       <p:par>
-        <p:cTn xmlns:p14="http://schemas.microsoft.com/office/powerpoint/2010/main" id="1" dur="indefinite" restart="never" nodeType="tmRoot"/>
+        <p:cTn id="1" dur="indefinite" restart="never" nodeType="tmRoot"/>
       </p:par>
     </p:tnLst>
   </p:timing>
@@ -7222,7 +7275,33 @@
           <a:p>
             <a:r>
               <a:rPr lang="en-US" dirty="0" smtClean="0"/>
-              <a:t>Options object controls some behaviors</a:t>
+              <a:t>Options object controls some </a:t>
+            </a:r>
+            <a:r>
+              <a:rPr lang="en-US" dirty="0" smtClean="0"/>
+              <a:t>behaviors</a:t>
+            </a:r>
+          </a:p>
+          <a:p>
+            <a:pPr lvl="1"/>
+            <a:r>
+              <a:rPr lang="en-US" dirty="0"/>
+              <a:t> </a:t>
+            </a:r>
+            <a:r>
+              <a:rPr lang="en-US" dirty="0" smtClean="0"/>
+              <a:t>icons: true       // adds folder, file icons</a:t>
+            </a:r>
+          </a:p>
+          <a:p>
+            <a:pPr lvl="1"/>
+            <a:r>
+              <a:rPr lang="en-US" dirty="0"/>
+              <a:t> </a:t>
+            </a:r>
+            <a:r>
+              <a:rPr lang="en-US" dirty="0" smtClean="0"/>
+              <a:t>view: ‘details’  // displays in a table</a:t>
             </a:r>
             <a:endParaRPr lang="en-US" dirty="0"/>
           </a:p>
@@ -7291,8 +7370,8 @@
         </p:nvSpPr>
         <p:spPr>
           <a:xfrm>
-            <a:off x="820387" y="3784193"/>
-            <a:ext cx="7333013" cy="1800493"/>
+            <a:off x="461169" y="3762756"/>
+            <a:ext cx="8229600" cy="1815882"/>
           </a:xfrm>
           <a:prstGeom prst="rect">
             <a:avLst/>
@@ -7503,16 +7582,16 @@
               <a:t>app.use</a:t>
             </a:r>
             <a:r>
-              <a:rPr lang="en-US" sz="1400" dirty="0">
-                <a:solidFill>
-                  <a:srgbClr val="000000"/>
-                </a:solidFill>
-                <a:latin typeface="Monaco"/>
-              </a:rPr>
-              <a:t>(</a:t>
-            </a:r>
-            <a:r>
-              <a:rPr lang="en-US" sz="1400" dirty="0" err="1">
+              <a:rPr lang="en-US" sz="1400" dirty="0" smtClean="0">
+                <a:solidFill>
+                  <a:srgbClr val="000000"/>
+                </a:solidFill>
+                <a:latin typeface="Monaco"/>
+              </a:rPr>
+              <a:t>(‘/ftp’, </a:t>
+            </a:r>
+            <a:r>
+              <a:rPr lang="en-US" sz="1400" dirty="0" err="1" smtClean="0">
                 <a:solidFill>
                   <a:srgbClr val="000000"/>
                 </a:solidFill>
@@ -7796,7 +7875,7 @@
   <p:timing>
     <p:tnLst>
       <p:par>
-        <p:cTn xmlns:p14="http://schemas.microsoft.com/office/powerpoint/2010/main" id="1" dur="indefinite" restart="never" nodeType="tmRoot"/>
+        <p:cTn id="1" dur="indefinite" restart="never" nodeType="tmRoot"/>
       </p:par>
     </p:tnLst>
   </p:timing>
@@ -7837,15 +7916,7 @@
           <a:p>
             <a:r>
               <a:rPr lang="en-US" dirty="0" smtClean="0"/>
-              <a:t>Serves directory </a:t>
-            </a:r>
-            <a:r>
-              <a:rPr lang="en-US" dirty="0" smtClean="0"/>
-              <a:t>listing </a:t>
-            </a:r>
-            <a:r>
-              <a:rPr lang="en-US" dirty="0" smtClean="0"/>
-              <a:t>allowing users to browse remote files</a:t>
+              <a:t>Serves directory listing allowing users to browse remote files</a:t>
             </a:r>
           </a:p>
           <a:p>
@@ -8327,7 +8398,7 @@
   <p:timing>
     <p:tnLst>
       <p:par>
-        <p:cTn xmlns:p14="http://schemas.microsoft.com/office/powerpoint/2010/main" id="1" dur="indefinite" restart="never" nodeType="tmRoot"/>
+        <p:cTn id="1" dur="indefinite" restart="never" nodeType="tmRoot"/>
       </p:par>
     </p:tnLst>
   </p:timing>
@@ -8501,7 +8572,7 @@
   <p:timing>
     <p:tnLst>
       <p:par>
-        <p:cTn xmlns:p14="http://schemas.microsoft.com/office/powerpoint/2010/main" id="1" dur="indefinite" restart="never" nodeType="tmRoot"/>
+        <p:cTn id="1" dur="indefinite" restart="never" nodeType="tmRoot"/>
       </p:par>
     </p:tnLst>
   </p:timing>
@@ -8683,7 +8754,7 @@
   <p:timing>
     <p:tnLst>
       <p:par>
-        <p:cTn xmlns:p14="http://schemas.microsoft.com/office/powerpoint/2010/main" id="1" dur="indefinite" restart="never" nodeType="tmRoot"/>
+        <p:cTn id="1" dur="indefinite" restart="never" nodeType="tmRoot"/>
       </p:par>
     </p:tnLst>
   </p:timing>
@@ -8786,7 +8857,7 @@
   <p:timing>
     <p:tnLst>
       <p:par>
-        <p:cTn xmlns:p14="http://schemas.microsoft.com/office/powerpoint/2010/main" id="1" dur="indefinite" restart="never" nodeType="tmRoot"/>
+        <p:cTn id="1" dur="indefinite" restart="never" nodeType="tmRoot"/>
       </p:par>
     </p:tnLst>
   </p:timing>
@@ -9622,7 +9693,7 @@
   <p:timing>
     <p:tnLst>
       <p:par>
-        <p:cTn xmlns:p14="http://schemas.microsoft.com/office/powerpoint/2010/main" id="1" dur="indefinite" restart="never" nodeType="tmRoot"/>
+        <p:cTn id="1" dur="indefinite" restart="never" nodeType="tmRoot"/>
       </p:par>
     </p:tnLst>
   </p:timing>
@@ -9850,7 +9921,7 @@
   <p:timing>
     <p:tnLst>
       <p:par>
-        <p:cTn xmlns:p14="http://schemas.microsoft.com/office/powerpoint/2010/main" id="1" dur="indefinite" restart="never" nodeType="tmRoot"/>
+        <p:cTn id="1" dur="indefinite" restart="never" nodeType="tmRoot"/>
       </p:par>
     </p:tnLst>
   </p:timing>
@@ -10100,7 +10171,7 @@
   <p:timing>
     <p:tnLst>
       <p:par>
-        <p:cTn xmlns:p14="http://schemas.microsoft.com/office/powerpoint/2010/main" id="1" dur="indefinite" restart="never" nodeType="tmRoot"/>
+        <p:cTn id="1" dur="indefinite" restart="never" nodeType="tmRoot"/>
       </p:par>
     </p:tnLst>
   </p:timing>
@@ -10915,7 +10986,7 @@
   <p:timing>
     <p:tnLst>
       <p:par>
-        <p:cTn xmlns:p14="http://schemas.microsoft.com/office/powerpoint/2010/main" id="1" dur="indefinite" restart="never" nodeType="tmRoot"/>
+        <p:cTn id="1" dur="indefinite" restart="never" nodeType="tmRoot"/>
       </p:par>
     </p:tnLst>
   </p:timing>
@@ -11490,7 +11561,7 @@
   <p:timing>
     <p:tnLst>
       <p:par>
-        <p:cTn xmlns:p14="http://schemas.microsoft.com/office/powerpoint/2010/main" id="1" dur="indefinite" restart="never" nodeType="tmRoot"/>
+        <p:cTn id="1" dur="indefinite" restart="never" nodeType="tmRoot"/>
       </p:par>
     </p:tnLst>
   </p:timing>
@@ -11782,7 +11853,7 @@
   <p:timing>
     <p:tnLst>
       <p:par>
-        <p:cTn xmlns:p14="http://schemas.microsoft.com/office/powerpoint/2010/main" id="1" dur="indefinite" restart="never" nodeType="tmRoot"/>
+        <p:cTn id="1" dur="indefinite" restart="never" nodeType="tmRoot"/>
       </p:par>
     </p:tnLst>
   </p:timing>

</xml_diff>